<commit_message>
render ready for monday's meeting
</commit_message>
<xml_diff>
--- a/R/products/figures/schematics.pptx
+++ b/R/products/figures/schematics.pptx
@@ -104,6 +104,11 @@
       </a:defRPr>
     </a:lvl9pPr>
   </p:defaultTextStyle>
+  <p:extLst>
+    <p:ext uri="{EFAFB233-063F-42B5-8137-9DF3F51BA10A}">
+      <p15:sldGuideLst xmlns:p15="http://schemas.microsoft.com/office/powerpoint/2012/main"/>
+    </p:ext>
+  </p:extLst>
 </p:presentation>
 </file>
 
@@ -254,7 +259,7 @@
           <a:p>
             <a:fld id="{5BB4DB7B-FAFF-7248-B049-E6C47210A378}" type="datetimeFigureOut">
               <a:rPr lang="en-US" smtClean="0"/>
-              <a:t>4/4/23</a:t>
+              <a:t>4/15/23</a:t>
             </a:fld>
             <a:endParaRPr lang="en-US"/>
           </a:p>
@@ -452,7 +457,7 @@
           <a:p>
             <a:fld id="{5BB4DB7B-FAFF-7248-B049-E6C47210A378}" type="datetimeFigureOut">
               <a:rPr lang="en-US" smtClean="0"/>
-              <a:t>4/4/23</a:t>
+              <a:t>4/15/23</a:t>
             </a:fld>
             <a:endParaRPr lang="en-US"/>
           </a:p>
@@ -660,7 +665,7 @@
           <a:p>
             <a:fld id="{5BB4DB7B-FAFF-7248-B049-E6C47210A378}" type="datetimeFigureOut">
               <a:rPr lang="en-US" smtClean="0"/>
-              <a:t>4/4/23</a:t>
+              <a:t>4/15/23</a:t>
             </a:fld>
             <a:endParaRPr lang="en-US"/>
           </a:p>
@@ -858,7 +863,7 @@
           <a:p>
             <a:fld id="{5BB4DB7B-FAFF-7248-B049-E6C47210A378}" type="datetimeFigureOut">
               <a:rPr lang="en-US" smtClean="0"/>
-              <a:t>4/4/23</a:t>
+              <a:t>4/15/23</a:t>
             </a:fld>
             <a:endParaRPr lang="en-US"/>
           </a:p>
@@ -1133,7 +1138,7 @@
           <a:p>
             <a:fld id="{5BB4DB7B-FAFF-7248-B049-E6C47210A378}" type="datetimeFigureOut">
               <a:rPr lang="en-US" smtClean="0"/>
-              <a:t>4/4/23</a:t>
+              <a:t>4/15/23</a:t>
             </a:fld>
             <a:endParaRPr lang="en-US"/>
           </a:p>
@@ -1398,7 +1403,7 @@
           <a:p>
             <a:fld id="{5BB4DB7B-FAFF-7248-B049-E6C47210A378}" type="datetimeFigureOut">
               <a:rPr lang="en-US" smtClean="0"/>
-              <a:t>4/4/23</a:t>
+              <a:t>4/15/23</a:t>
             </a:fld>
             <a:endParaRPr lang="en-US"/>
           </a:p>
@@ -1810,7 +1815,7 @@
           <a:p>
             <a:fld id="{5BB4DB7B-FAFF-7248-B049-E6C47210A378}" type="datetimeFigureOut">
               <a:rPr lang="en-US" smtClean="0"/>
-              <a:t>4/4/23</a:t>
+              <a:t>4/15/23</a:t>
             </a:fld>
             <a:endParaRPr lang="en-US"/>
           </a:p>
@@ -1951,7 +1956,7 @@
           <a:p>
             <a:fld id="{5BB4DB7B-FAFF-7248-B049-E6C47210A378}" type="datetimeFigureOut">
               <a:rPr lang="en-US" smtClean="0"/>
-              <a:t>4/4/23</a:t>
+              <a:t>4/15/23</a:t>
             </a:fld>
             <a:endParaRPr lang="en-US"/>
           </a:p>
@@ -2064,7 +2069,7 @@
           <a:p>
             <a:fld id="{5BB4DB7B-FAFF-7248-B049-E6C47210A378}" type="datetimeFigureOut">
               <a:rPr lang="en-US" smtClean="0"/>
-              <a:t>4/4/23</a:t>
+              <a:t>4/15/23</a:t>
             </a:fld>
             <a:endParaRPr lang="en-US"/>
           </a:p>
@@ -2375,7 +2380,7 @@
           <a:p>
             <a:fld id="{5BB4DB7B-FAFF-7248-B049-E6C47210A378}" type="datetimeFigureOut">
               <a:rPr lang="en-US" smtClean="0"/>
-              <a:t>4/4/23</a:t>
+              <a:t>4/15/23</a:t>
             </a:fld>
             <a:endParaRPr lang="en-US"/>
           </a:p>
@@ -2663,7 +2668,7 @@
           <a:p>
             <a:fld id="{5BB4DB7B-FAFF-7248-B049-E6C47210A378}" type="datetimeFigureOut">
               <a:rPr lang="en-US" smtClean="0"/>
-              <a:t>4/4/23</a:t>
+              <a:t>4/15/23</a:t>
             </a:fld>
             <a:endParaRPr lang="en-US"/>
           </a:p>
@@ -2904,7 +2909,7 @@
           <a:p>
             <a:fld id="{5BB4DB7B-FAFF-7248-B049-E6C47210A378}" type="datetimeFigureOut">
               <a:rPr lang="en-US" smtClean="0"/>
-              <a:t>4/4/23</a:t>
+              <a:t>4/15/23</a:t>
             </a:fld>
             <a:endParaRPr lang="en-US"/>
           </a:p>
@@ -4106,9 +4111,9 @@
         <p:grpSpPr>
           <a:xfrm>
             <a:off x="3906112" y="1814777"/>
-            <a:ext cx="1929259" cy="307777"/>
+            <a:ext cx="2001907" cy="307777"/>
             <a:chOff x="3661792" y="1348850"/>
-            <a:chExt cx="1929259" cy="307777"/>
+            <a:chExt cx="2001907" cy="307777"/>
           </a:xfrm>
         </p:grpSpPr>
         <p:cxnSp>
@@ -4164,7 +4169,7 @@
           <p:spPr>
             <a:xfrm>
               <a:off x="4144180" y="1348850"/>
-              <a:ext cx="1446871" cy="307777"/>
+              <a:ext cx="1519519" cy="307777"/>
             </a:xfrm>
             <a:prstGeom prst="rect">
               <a:avLst/>
@@ -4181,7 +4186,7 @@
                 <a:rPr lang="en-US" sz="1400" i="1" dirty="0">
                   <a:latin typeface="Abadi MT Condensed Light" panose="020B0306030101010103" pitchFamily="34" charset="77"/>
                 </a:rPr>
-                <a:t>Individual-level trend</a:t>
+                <a:t>Within-individual trend</a:t>
               </a:r>
             </a:p>
           </p:txBody>
@@ -4202,9 +4207,9 @@
         <p:grpSpPr>
           <a:xfrm>
             <a:off x="3908686" y="2142717"/>
-            <a:ext cx="1994853" cy="307777"/>
+            <a:ext cx="1882964" cy="307777"/>
             <a:chOff x="3661792" y="1964713"/>
-            <a:chExt cx="1994853" cy="307777"/>
+            <a:chExt cx="1882964" cy="307777"/>
           </a:xfrm>
         </p:grpSpPr>
         <p:sp>
@@ -4222,7 +4227,7 @@
           <p:spPr>
             <a:xfrm>
               <a:off x="4144180" y="1964713"/>
-              <a:ext cx="1512465" cy="307777"/>
+              <a:ext cx="1400576" cy="307777"/>
             </a:xfrm>
             <a:prstGeom prst="rect">
               <a:avLst/>
@@ -4239,7 +4244,7 @@
                 <a:rPr lang="en-US" sz="1400" i="1" dirty="0">
                   <a:latin typeface="Abadi MT Condensed Light" panose="020B0306030101010103" pitchFamily="34" charset="77"/>
                 </a:rPr>
-                <a:t>population-level trend</a:t>
+                <a:t>Ordinary regression</a:t>
               </a:r>
             </a:p>
           </p:txBody>

</xml_diff>